<commit_message>
Added transitions between slides
</commit_message>
<xml_diff>
--- a/Präsentation/Quiz With Me.pptx
+++ b/Präsentation/Quiz With Me.pptx
@@ -5,10 +5,10 @@
     <p:sldMasterId id="2147483660" r:id="rId1"/>
   </p:sldMasterIdLst>
   <p:notesMasterIdLst>
-    <p:notesMasterId r:id="rId23"/>
+    <p:notesMasterId r:id="rId25"/>
   </p:notesMasterIdLst>
   <p:handoutMasterIdLst>
-    <p:handoutMasterId r:id="rId24"/>
+    <p:handoutMasterId r:id="rId26"/>
   </p:handoutMasterIdLst>
   <p:sldIdLst>
     <p:sldId id="256" r:id="rId2"/>
@@ -32,6 +32,8 @@
     <p:sldId id="274" r:id="rId20"/>
     <p:sldId id="275" r:id="rId21"/>
     <p:sldId id="276" r:id="rId22"/>
+    <p:sldId id="277" r:id="rId23"/>
+    <p:sldId id="278" r:id="rId24"/>
   </p:sldIdLst>
   <p:sldSz cx="12192000" cy="6858000"/>
   <p:notesSz cx="6858000" cy="9144000"/>
@@ -156,6 +158,8 @@
             <p14:sldId id="274"/>
             <p14:sldId id="275"/>
             <p14:sldId id="276"/>
+            <p14:sldId id="277"/>
+            <p14:sldId id="278"/>
           </p14:sldIdLst>
         </p14:section>
       </p14:sectionLst>
@@ -1483,7 +1487,7 @@
           <a:p>
             <a:fld id="{54F19D18-8B19-46CD-9945-D473D203DC62}" type="datetimeFigureOut">
               <a:rPr lang="de-DE" smtClean="0"/>
-              <a:t>27.06.2021</a:t>
+              <a:t>29.06.2021</a:t>
             </a:fld>
             <a:endParaRPr lang="de-DE"/>
           </a:p>
@@ -1660,7 +1664,7 @@
           <a:p>
             <a:fld id="{55C1D5A6-4300-422B-B653-7AE01DFE6238}" type="datetimeFigureOut">
               <a:rPr lang="de-DE" smtClean="0"/>
-              <a:t>27.06.2021</a:t>
+              <a:t>29.06.2021</a:t>
             </a:fld>
             <a:endParaRPr lang="de-DE"/>
           </a:p>
@@ -2142,7 +2146,7 @@
           <a:p>
             <a:fld id="{D8A19376-E955-4925-9EA0-2A7DB6BAD835}" type="datetime1">
               <a:rPr lang="de-DE" smtClean="0"/>
-              <a:t>27.06.2021</a:t>
+              <a:t>29.06.2021</a:t>
             </a:fld>
             <a:endParaRPr lang="de-DE"/>
           </a:p>
@@ -2315,7 +2319,7 @@
           <a:p>
             <a:fld id="{F1108507-F884-4F9F-B071-3D30EBB8A7D4}" type="datetime1">
               <a:rPr lang="de-DE" smtClean="0"/>
-              <a:t>27.06.2021</a:t>
+              <a:t>29.06.2021</a:t>
             </a:fld>
             <a:endParaRPr lang="de-DE"/>
           </a:p>
@@ -2498,7 +2502,7 @@
           <a:p>
             <a:fld id="{F72011DE-5B3A-4166-8C73-FCF3C153995C}" type="datetime1">
               <a:rPr lang="de-DE" smtClean="0"/>
-              <a:t>27.06.2021</a:t>
+              <a:t>29.06.2021</a:t>
             </a:fld>
             <a:endParaRPr lang="de-DE"/>
           </a:p>
@@ -2671,7 +2675,7 @@
           <a:p>
             <a:fld id="{32039728-7564-466C-990A-59FEFE8A68B2}" type="datetime1">
               <a:rPr lang="de-DE" smtClean="0"/>
-              <a:t>27.06.2021</a:t>
+              <a:t>29.06.2021</a:t>
             </a:fld>
             <a:endParaRPr lang="de-DE"/>
           </a:p>
@@ -2920,7 +2924,7 @@
           <a:p>
             <a:fld id="{2BF4FC10-CBCF-4523-9905-E5CF601A79DD}" type="datetime1">
               <a:rPr lang="de-DE" smtClean="0"/>
-              <a:t>27.06.2021</a:t>
+              <a:t>29.06.2021</a:t>
             </a:fld>
             <a:endParaRPr lang="de-DE"/>
           </a:p>
@@ -3155,7 +3159,7 @@
           <a:p>
             <a:fld id="{AD1A4B27-F142-471B-A5EF-2BCAE931C055}" type="datetime1">
               <a:rPr lang="de-DE" smtClean="0"/>
-              <a:t>27.06.2021</a:t>
+              <a:t>29.06.2021</a:t>
             </a:fld>
             <a:endParaRPr lang="de-DE"/>
           </a:p>
@@ -3561,7 +3565,7 @@
           <a:p>
             <a:fld id="{3E886CAF-4360-4864-AE45-3A9CCCB2BF39}" type="datetime1">
               <a:rPr lang="de-DE" smtClean="0"/>
-              <a:t>27.06.2021</a:t>
+              <a:t>29.06.2021</a:t>
             </a:fld>
             <a:endParaRPr lang="de-DE"/>
           </a:p>
@@ -3682,7 +3686,7 @@
           <a:p>
             <a:fld id="{3AF4B984-8CD3-4740-832A-B70A050F58CE}" type="datetime1">
               <a:rPr lang="de-DE" smtClean="0"/>
-              <a:t>27.06.2021</a:t>
+              <a:t>29.06.2021</a:t>
             </a:fld>
             <a:endParaRPr lang="de-DE"/>
           </a:p>
@@ -3780,7 +3784,7 @@
           <a:p>
             <a:fld id="{A4D1AFD6-737E-4001-9DE6-1F6B7CA26136}" type="datetime1">
               <a:rPr lang="de-DE" smtClean="0"/>
-              <a:t>27.06.2021</a:t>
+              <a:t>29.06.2021</a:t>
             </a:fld>
             <a:endParaRPr lang="de-DE"/>
           </a:p>
@@ -4060,7 +4064,7 @@
           <a:p>
             <a:fld id="{4479FD83-085F-4957-B497-E70B143BA4C3}" type="datetime1">
               <a:rPr lang="de-DE" smtClean="0"/>
-              <a:t>27.06.2021</a:t>
+              <a:t>29.06.2021</a:t>
             </a:fld>
             <a:endParaRPr lang="de-DE"/>
           </a:p>
@@ -4320,7 +4324,7 @@
           <a:p>
             <a:fld id="{B4330FE9-4544-4D03-BD5F-38156A083000}" type="datetime1">
               <a:rPr lang="de-DE" smtClean="0"/>
-              <a:t>27.06.2021</a:t>
+              <a:t>29.06.2021</a:t>
             </a:fld>
             <a:endParaRPr lang="de-DE"/>
           </a:p>
@@ -4536,7 +4540,7 @@
           <a:p>
             <a:fld id="{68D95285-0EB6-45FF-A0FE-7D2BF38BCCE1}" type="datetime1">
               <a:rPr lang="de-DE" smtClean="0"/>
-              <a:t>27.06.2021</a:t>
+              <a:t>29.06.2021</a:t>
             </a:fld>
             <a:endParaRPr lang="de-DE"/>
           </a:p>
@@ -5443,6 +5447,9 @@
   <p:clrMapOvr>
     <a:masterClrMapping/>
   </p:clrMapOvr>
+  <p:transition spd="med">
+    <p:pull/>
+  </p:transition>
 </p:sld>
 </file>
 
@@ -5586,6 +5593,9 @@
   <p:clrMapOvr>
     <a:masterClrMapping/>
   </p:clrMapOvr>
+  <p:transition spd="slow">
+    <p:push dir="u"/>
+  </p:transition>
 </p:sld>
 </file>
 
@@ -5857,6 +5867,9 @@
   <p:clrMapOvr>
     <a:masterClrMapping/>
   </p:clrMapOvr>
+  <p:transition spd="med">
+    <p:pull/>
+  </p:transition>
 </p:sld>
 </file>
 
@@ -6107,6 +6120,9 @@
   <p:clrMapOvr>
     <a:masterClrMapping/>
   </p:clrMapOvr>
+  <p:transition spd="med">
+    <p:pull/>
+  </p:transition>
 </p:sld>
 </file>
 
@@ -6849,6 +6865,9 @@
   <p:clrMapOvr>
     <a:masterClrMapping/>
   </p:clrMapOvr>
+  <p:transition spd="med">
+    <p:pull/>
+  </p:transition>
 </p:sld>
 </file>
 
@@ -7236,6 +7255,9 @@
   <p:clrMapOvr>
     <a:masterClrMapping/>
   </p:clrMapOvr>
+  <p:transition spd="med">
+    <p:pull/>
+  </p:transition>
 </p:sld>
 </file>
 
@@ -7464,6 +7486,9 @@
   <p:clrMapOvr>
     <a:masterClrMapping/>
   </p:clrMapOvr>
+  <p:transition spd="med">
+    <p:pull/>
+  </p:transition>
 </p:sld>
 </file>
 
@@ -8276,6 +8301,9 @@
   <p:clrMapOvr>
     <a:masterClrMapping/>
   </p:clrMapOvr>
+  <p:transition spd="med">
+    <p:pull/>
+  </p:transition>
 </p:sld>
 </file>
 
@@ -8530,6 +8558,9 @@
   <p:clrMapOvr>
     <a:masterClrMapping/>
   </p:clrMapOvr>
+  <p:transition spd="med">
+    <p:pull/>
+  </p:transition>
 </p:sld>
 </file>
 
@@ -9751,6 +9782,9 @@
   <p:clrMapOvr>
     <a:masterClrMapping/>
   </p:clrMapOvr>
+  <p:transition spd="med">
+    <p:pull/>
+  </p:transition>
 </p:sld>
 </file>
 
@@ -10588,6 +10622,9 @@
   <p:clrMapOvr>
     <a:masterClrMapping/>
   </p:clrMapOvr>
+  <p:transition spd="slow">
+    <p:wipe/>
+  </p:transition>
 </p:sld>
 </file>
 
@@ -10818,6 +10855,316 @@
   <p:clrMapOvr>
     <a:masterClrMapping/>
   </p:clrMapOvr>
+  <p:transition spd="med">
+    <p:pull/>
+  </p:transition>
+</p:sld>
+</file>
+
+<file path=ppt/slides/slide22.xml><?xml version="1.0" encoding="utf-8"?>
+<p:sld xmlns:a="http://schemas.openxmlformats.org/drawingml/2006/main" xmlns:r="http://schemas.openxmlformats.org/officeDocument/2006/relationships" xmlns:p="http://schemas.openxmlformats.org/presentationml/2006/main">
+  <p:cSld>
+    <p:spTree>
+      <p:nvGrpSpPr>
+        <p:cNvPr id="1" name=""/>
+        <p:cNvGrpSpPr/>
+        <p:nvPr/>
+      </p:nvGrpSpPr>
+      <p:grpSpPr>
+        <a:xfrm>
+          <a:off x="0" y="0"/>
+          <a:ext cx="0" cy="0"/>
+          <a:chOff x="0" y="0"/>
+          <a:chExt cx="0" cy="0"/>
+        </a:xfrm>
+      </p:grpSpPr>
+      <p:sp>
+        <p:nvSpPr>
+          <p:cNvPr id="2" name="Titel 1">
+            <a:extLst>
+              <a:ext uri="{FF2B5EF4-FFF2-40B4-BE49-F238E27FC236}">
+                <a16:creationId xmlns:a16="http://schemas.microsoft.com/office/drawing/2014/main" id="{DF9C8520-3344-4E03-9FFA-A731F0DB0E95}"/>
+              </a:ext>
+            </a:extLst>
+          </p:cNvPr>
+          <p:cNvSpPr>
+            <a:spLocks noGrp="1"/>
+          </p:cNvSpPr>
+          <p:nvPr>
+            <p:ph type="title"/>
+          </p:nvPr>
+        </p:nvSpPr>
+        <p:spPr/>
+        <p:txBody>
+          <a:bodyPr/>
+          <a:lstStyle/>
+          <a:p>
+            <a:r>
+              <a:rPr lang="de-DE" dirty="0"/>
+              <a:t>Quellen</a:t>
+            </a:r>
+          </a:p>
+        </p:txBody>
+      </p:sp>
+      <p:sp>
+        <p:nvSpPr>
+          <p:cNvPr id="4" name="Fußzeilenplatzhalter 3">
+            <a:extLst>
+              <a:ext uri="{FF2B5EF4-FFF2-40B4-BE49-F238E27FC236}">
+                <a16:creationId xmlns:a16="http://schemas.microsoft.com/office/drawing/2014/main" id="{F43C305A-3BE1-411C-9E60-B820CE4BF4CA}"/>
+              </a:ext>
+            </a:extLst>
+          </p:cNvPr>
+          <p:cNvSpPr>
+            <a:spLocks noGrp="1"/>
+          </p:cNvSpPr>
+          <p:nvPr>
+            <p:ph type="ftr" sz="quarter" idx="11"/>
+          </p:nvPr>
+        </p:nvSpPr>
+        <p:spPr/>
+        <p:txBody>
+          <a:bodyPr/>
+          <a:lstStyle/>
+          <a:p>
+            <a:r>
+              <a:rPr lang="de-DE"/>
+              <a:t>Swift-Programmierung unter iOS: Accessibility</a:t>
+            </a:r>
+          </a:p>
+        </p:txBody>
+      </p:sp>
+      <p:sp>
+        <p:nvSpPr>
+          <p:cNvPr id="5" name="Foliennummernplatzhalter 4">
+            <a:extLst>
+              <a:ext uri="{FF2B5EF4-FFF2-40B4-BE49-F238E27FC236}">
+                <a16:creationId xmlns:a16="http://schemas.microsoft.com/office/drawing/2014/main" id="{B0B9F3E1-9127-47DC-A522-60D372D6F664}"/>
+              </a:ext>
+            </a:extLst>
+          </p:cNvPr>
+          <p:cNvSpPr>
+            <a:spLocks noGrp="1"/>
+          </p:cNvSpPr>
+          <p:nvPr>
+            <p:ph type="sldNum" sz="quarter" idx="12"/>
+          </p:nvPr>
+        </p:nvSpPr>
+        <p:spPr/>
+        <p:txBody>
+          <a:bodyPr/>
+          <a:lstStyle/>
+          <a:p>
+            <a:fld id="{49969A2D-4621-42E2-BC1F-C9E4503934D0}" type="slidenum">
+              <a:rPr lang="de-DE" smtClean="0"/>
+              <a:t>21</a:t>
+            </a:fld>
+            <a:endParaRPr lang="de-DE"/>
+          </a:p>
+        </p:txBody>
+      </p:sp>
+    </p:spTree>
+    <p:extLst>
+      <p:ext uri="{BB962C8B-B14F-4D97-AF65-F5344CB8AC3E}">
+        <p14:creationId xmlns:p14="http://schemas.microsoft.com/office/powerpoint/2010/main" val="2783589156"/>
+      </p:ext>
+    </p:extLst>
+  </p:cSld>
+  <p:clrMapOvr>
+    <a:masterClrMapping/>
+  </p:clrMapOvr>
+  <p:transition spd="slow">
+    <p:push dir="u"/>
+  </p:transition>
+</p:sld>
+</file>
+
+<file path=ppt/slides/slide23.xml><?xml version="1.0" encoding="utf-8"?>
+<p:sld xmlns:a="http://schemas.openxmlformats.org/drawingml/2006/main" xmlns:r="http://schemas.openxmlformats.org/officeDocument/2006/relationships" xmlns:p="http://schemas.openxmlformats.org/presentationml/2006/main">
+  <p:cSld>
+    <p:spTree>
+      <p:nvGrpSpPr>
+        <p:cNvPr id="1" name=""/>
+        <p:cNvGrpSpPr/>
+        <p:nvPr/>
+      </p:nvGrpSpPr>
+      <p:grpSpPr>
+        <a:xfrm>
+          <a:off x="0" y="0"/>
+          <a:ext cx="0" cy="0"/>
+          <a:chOff x="0" y="0"/>
+          <a:chExt cx="0" cy="0"/>
+        </a:xfrm>
+      </p:grpSpPr>
+      <p:sp>
+        <p:nvSpPr>
+          <p:cNvPr id="2" name="Titel 1">
+            <a:extLst>
+              <a:ext uri="{FF2B5EF4-FFF2-40B4-BE49-F238E27FC236}">
+                <a16:creationId xmlns:a16="http://schemas.microsoft.com/office/drawing/2014/main" id="{52CAB2F8-1ABD-43CA-8067-8CC5BC221BAD}"/>
+              </a:ext>
+            </a:extLst>
+          </p:cNvPr>
+          <p:cNvSpPr>
+            <a:spLocks noGrp="1"/>
+          </p:cNvSpPr>
+          <p:nvPr>
+            <p:ph type="title"/>
+          </p:nvPr>
+        </p:nvSpPr>
+        <p:spPr>
+          <a:xfrm>
+            <a:off x="838200" y="605367"/>
+            <a:ext cx="10515600" cy="1085321"/>
+          </a:xfrm>
+        </p:spPr>
+        <p:txBody>
+          <a:bodyPr/>
+          <a:lstStyle/>
+          <a:p>
+            <a:pPr algn="ctr"/>
+            <a:r>
+              <a:rPr lang="de-DE" b="1" dirty="0"/>
+              <a:t>Quellen</a:t>
+            </a:r>
+          </a:p>
+        </p:txBody>
+      </p:sp>
+      <p:sp>
+        <p:nvSpPr>
+          <p:cNvPr id="3" name="Inhaltsplatzhalter 2">
+            <a:extLst>
+              <a:ext uri="{FF2B5EF4-FFF2-40B4-BE49-F238E27FC236}">
+                <a16:creationId xmlns:a16="http://schemas.microsoft.com/office/drawing/2014/main" id="{C9FB1D23-DBE9-45BD-A46B-41DE33A2D607}"/>
+              </a:ext>
+            </a:extLst>
+          </p:cNvPr>
+          <p:cNvSpPr>
+            <a:spLocks noGrp="1"/>
+          </p:cNvSpPr>
+          <p:nvPr>
+            <p:ph idx="1"/>
+          </p:nvPr>
+        </p:nvSpPr>
+        <p:spPr/>
+        <p:txBody>
+          <a:bodyPr/>
+          <a:lstStyle/>
+          <a:p>
+            <a:r>
+              <a:rPr lang="de-DE" dirty="0"/>
+              <a:t>17.12.2018, „</a:t>
+            </a:r>
+            <a:r>
+              <a:rPr lang="de-DE" dirty="0" err="1"/>
+              <a:t>Avoiding</a:t>
+            </a:r>
+            <a:r>
+              <a:rPr lang="de-DE" dirty="0"/>
+              <a:t> Callback Hell in Swift“:</a:t>
+            </a:r>
+            <a:br>
+              <a:rPr lang="de-DE" dirty="0"/>
+            </a:br>
+            <a:r>
+              <a:rPr lang="de-DE" dirty="0">
+                <a:hlinkClick r:id="rId2"/>
+              </a:rPr>
+              <a:t>https://swiftrocks.com/avoiding-callback-hell-in-swift</a:t>
+            </a:r>
+            <a:endParaRPr lang="de-DE" dirty="0"/>
+          </a:p>
+          <a:p>
+            <a:r>
+              <a:rPr lang="de-DE" dirty="0"/>
+              <a:t>SWTP-SS20-Kammer-2 (Projekt-Repository):</a:t>
+            </a:r>
+            <a:br>
+              <a:rPr lang="de-DE" dirty="0"/>
+            </a:br>
+            <a:r>
+              <a:rPr lang="de-DE" dirty="0">
+                <a:hlinkClick r:id="rId3"/>
+              </a:rPr>
+              <a:t>https://github.com/SWTP-SS20-Kammer-2/Data-Analytics</a:t>
+            </a:r>
+            <a:r>
+              <a:rPr lang="de-DE" dirty="0"/>
+              <a:t> </a:t>
+            </a:r>
+          </a:p>
+        </p:txBody>
+      </p:sp>
+      <p:sp>
+        <p:nvSpPr>
+          <p:cNvPr id="4" name="Fußzeilenplatzhalter 3">
+            <a:extLst>
+              <a:ext uri="{FF2B5EF4-FFF2-40B4-BE49-F238E27FC236}">
+                <a16:creationId xmlns:a16="http://schemas.microsoft.com/office/drawing/2014/main" id="{F7BC7236-A4F0-480F-9560-7DA531A3B31C}"/>
+              </a:ext>
+            </a:extLst>
+          </p:cNvPr>
+          <p:cNvSpPr>
+            <a:spLocks noGrp="1"/>
+          </p:cNvSpPr>
+          <p:nvPr>
+            <p:ph type="ftr" sz="quarter" idx="11"/>
+          </p:nvPr>
+        </p:nvSpPr>
+        <p:spPr/>
+        <p:txBody>
+          <a:bodyPr/>
+          <a:lstStyle/>
+          <a:p>
+            <a:r>
+              <a:rPr lang="de-DE"/>
+              <a:t>Swift-Programmierung unter iOS: Accessibility</a:t>
+            </a:r>
+          </a:p>
+        </p:txBody>
+      </p:sp>
+      <p:sp>
+        <p:nvSpPr>
+          <p:cNvPr id="5" name="Foliennummernplatzhalter 4">
+            <a:extLst>
+              <a:ext uri="{FF2B5EF4-FFF2-40B4-BE49-F238E27FC236}">
+                <a16:creationId xmlns:a16="http://schemas.microsoft.com/office/drawing/2014/main" id="{A98E7668-23F6-44C0-B077-F27B2F05A6B9}"/>
+              </a:ext>
+            </a:extLst>
+          </p:cNvPr>
+          <p:cNvSpPr>
+            <a:spLocks noGrp="1"/>
+          </p:cNvSpPr>
+          <p:nvPr>
+            <p:ph type="sldNum" sz="quarter" idx="12"/>
+          </p:nvPr>
+        </p:nvSpPr>
+        <p:spPr/>
+        <p:txBody>
+          <a:bodyPr/>
+          <a:lstStyle/>
+          <a:p>
+            <a:fld id="{49969A2D-4621-42E2-BC1F-C9E4503934D0}" type="slidenum">
+              <a:rPr lang="de-DE" smtClean="0"/>
+              <a:t>22</a:t>
+            </a:fld>
+            <a:endParaRPr lang="de-DE"/>
+          </a:p>
+        </p:txBody>
+      </p:sp>
+    </p:spTree>
+    <p:extLst>
+      <p:ext uri="{BB962C8B-B14F-4D97-AF65-F5344CB8AC3E}">
+        <p14:creationId xmlns:p14="http://schemas.microsoft.com/office/powerpoint/2010/main" val="309301293"/>
+      </p:ext>
+    </p:extLst>
+  </p:cSld>
+  <p:clrMapOvr>
+    <a:masterClrMapping/>
+  </p:clrMapOvr>
+  <p:transition spd="med">
+    <p:pull/>
+  </p:transition>
 </p:sld>
 </file>
 
@@ -10989,6 +11336,9 @@
   <p:clrMapOvr>
     <a:masterClrMapping/>
   </p:clrMapOvr>
+  <p:transition spd="slow">
+    <p:push dir="u"/>
+  </p:transition>
 </p:sld>
 </file>
 
@@ -11200,6 +11550,9 @@
   <p:clrMapOvr>
     <a:masterClrMapping/>
   </p:clrMapOvr>
+  <p:transition spd="med">
+    <p:pull/>
+  </p:transition>
 </p:sld>
 </file>
 
@@ -11343,6 +11696,9 @@
   <p:clrMapOvr>
     <a:masterClrMapping/>
   </p:clrMapOvr>
+  <p:transition spd="slow">
+    <p:push dir="u"/>
+  </p:transition>
 </p:sld>
 </file>
 
@@ -11522,6 +11878,9 @@
   <p:clrMapOvr>
     <a:masterClrMapping/>
   </p:clrMapOvr>
+  <p:transition spd="med">
+    <p:pull/>
+  </p:transition>
 </p:sld>
 </file>
 
@@ -11772,6 +12131,9 @@
   <p:clrMapOvr>
     <a:masterClrMapping/>
   </p:clrMapOvr>
+  <p:transition spd="med">
+    <p:pull/>
+  </p:transition>
 </p:sld>
 </file>
 
@@ -11928,6 +12290,9 @@
   <p:clrMapOvr>
     <a:masterClrMapping/>
   </p:clrMapOvr>
+  <p:transition spd="med">
+    <p:pull/>
+  </p:transition>
 </p:sld>
 </file>
 
@@ -12131,6 +12496,9 @@
   <p:clrMapOvr>
     <a:masterClrMapping/>
   </p:clrMapOvr>
+  <p:transition spd="med">
+    <p:pull/>
+  </p:transition>
 </p:sld>
 </file>
 

</xml_diff>

<commit_message>
Changed statistics in presentation
</commit_message>
<xml_diff>
--- a/Präsentation/Quiz With Me.pptx
+++ b/Präsentation/Quiz With Me.pptx
@@ -5161,7 +5161,7 @@
             <p:ph idx="1"/>
             <p:extLst>
               <p:ext uri="{D42A27DB-BD31-4B8C-83A1-F6EECF244321}">
-                <p14:modId xmlns:p14="http://schemas.microsoft.com/office/powerpoint/2010/main" val="2960856763"/>
+                <p14:modId xmlns:p14="http://schemas.microsoft.com/office/powerpoint/2010/main" val="4211647106"/>
               </p:ext>
             </p:extLst>
           </p:nvPr>
@@ -5221,7 +5221,7 @@
                     <a:p>
                       <a:r>
                         <a:rPr lang="de-DE" sz="2800" dirty="0"/>
-                        <a:t>Ca 1950</a:t>
+                        <a:t>Ca 1970</a:t>
                       </a:r>
                     </a:p>
                   </a:txBody>
@@ -5255,7 +5255,7 @@
                     <a:p>
                       <a:r>
                         <a:rPr lang="de-DE" sz="2800" dirty="0"/>
-                        <a:t>Ca. 140</a:t>
+                        <a:t>Ca. 150</a:t>
                       </a:r>
                     </a:p>
                   </a:txBody>

</xml_diff>